<commit_message>
update. Playback is tested again.
</commit_message>
<xml_diff>
--- a/documentations/imageMaker.pptx
+++ b/documentations/imageMaker.pptx
@@ -5,8 +5,9 @@
     <p:sldMasterId id="2147483660" r:id="rId1"/>
   </p:sldMasterIdLst>
   <p:sldIdLst>
-    <p:sldId id="258" r:id="rId2"/>
-    <p:sldId id="257" r:id="rId3"/>
+    <p:sldId id="259" r:id="rId2"/>
+    <p:sldId id="258" r:id="rId3"/>
+    <p:sldId id="257" r:id="rId4"/>
   </p:sldIdLst>
   <p:sldSz cx="9906000" cy="6858000" type="A4"/>
   <p:notesSz cx="6858000" cy="9144000"/>
@@ -244,7 +245,7 @@
           <a:p>
             <a:fld id="{4BC6EA22-CCE4-4220-8B4C-68A9C409F945}" type="datetimeFigureOut">
               <a:rPr lang="en-AU" smtClean="0"/>
-              <a:t>15/6/2024</a:t>
+              <a:t>26/11/2024</a:t>
             </a:fld>
             <a:endParaRPr lang="en-AU"/>
           </a:p>
@@ -414,7 +415,7 @@
           <a:p>
             <a:fld id="{4BC6EA22-CCE4-4220-8B4C-68A9C409F945}" type="datetimeFigureOut">
               <a:rPr lang="en-AU" smtClean="0"/>
-              <a:t>15/6/2024</a:t>
+              <a:t>26/11/2024</a:t>
             </a:fld>
             <a:endParaRPr lang="en-AU"/>
           </a:p>
@@ -594,7 +595,7 @@
           <a:p>
             <a:fld id="{4BC6EA22-CCE4-4220-8B4C-68A9C409F945}" type="datetimeFigureOut">
               <a:rPr lang="en-AU" smtClean="0"/>
-              <a:t>15/6/2024</a:t>
+              <a:t>26/11/2024</a:t>
             </a:fld>
             <a:endParaRPr lang="en-AU"/>
           </a:p>
@@ -764,7 +765,7 @@
           <a:p>
             <a:fld id="{4BC6EA22-CCE4-4220-8B4C-68A9C409F945}" type="datetimeFigureOut">
               <a:rPr lang="en-AU" smtClean="0"/>
-              <a:t>15/6/2024</a:t>
+              <a:t>26/11/2024</a:t>
             </a:fld>
             <a:endParaRPr lang="en-AU"/>
           </a:p>
@@ -1010,7 +1011,7 @@
           <a:p>
             <a:fld id="{4BC6EA22-CCE4-4220-8B4C-68A9C409F945}" type="datetimeFigureOut">
               <a:rPr lang="en-AU" smtClean="0"/>
-              <a:t>15/6/2024</a:t>
+              <a:t>26/11/2024</a:t>
             </a:fld>
             <a:endParaRPr lang="en-AU"/>
           </a:p>
@@ -1242,7 +1243,7 @@
           <a:p>
             <a:fld id="{4BC6EA22-CCE4-4220-8B4C-68A9C409F945}" type="datetimeFigureOut">
               <a:rPr lang="en-AU" smtClean="0"/>
-              <a:t>15/6/2024</a:t>
+              <a:t>26/11/2024</a:t>
             </a:fld>
             <a:endParaRPr lang="en-AU"/>
           </a:p>
@@ -1609,7 +1610,7 @@
           <a:p>
             <a:fld id="{4BC6EA22-CCE4-4220-8B4C-68A9C409F945}" type="datetimeFigureOut">
               <a:rPr lang="en-AU" smtClean="0"/>
-              <a:t>15/6/2024</a:t>
+              <a:t>26/11/2024</a:t>
             </a:fld>
             <a:endParaRPr lang="en-AU"/>
           </a:p>
@@ -1727,7 +1728,7 @@
           <a:p>
             <a:fld id="{4BC6EA22-CCE4-4220-8B4C-68A9C409F945}" type="datetimeFigureOut">
               <a:rPr lang="en-AU" smtClean="0"/>
-              <a:t>15/6/2024</a:t>
+              <a:t>26/11/2024</a:t>
             </a:fld>
             <a:endParaRPr lang="en-AU"/>
           </a:p>
@@ -1822,7 +1823,7 @@
           <a:p>
             <a:fld id="{4BC6EA22-CCE4-4220-8B4C-68A9C409F945}" type="datetimeFigureOut">
               <a:rPr lang="en-AU" smtClean="0"/>
-              <a:t>15/6/2024</a:t>
+              <a:t>26/11/2024</a:t>
             </a:fld>
             <a:endParaRPr lang="en-AU"/>
           </a:p>
@@ -2099,7 +2100,7 @@
           <a:p>
             <a:fld id="{4BC6EA22-CCE4-4220-8B4C-68A9C409F945}" type="datetimeFigureOut">
               <a:rPr lang="en-AU" smtClean="0"/>
-              <a:t>15/6/2024</a:t>
+              <a:t>26/11/2024</a:t>
             </a:fld>
             <a:endParaRPr lang="en-AU"/>
           </a:p>
@@ -2356,7 +2357,7 @@
           <a:p>
             <a:fld id="{4BC6EA22-CCE4-4220-8B4C-68A9C409F945}" type="datetimeFigureOut">
               <a:rPr lang="en-AU" smtClean="0"/>
-              <a:t>15/6/2024</a:t>
+              <a:t>26/11/2024</a:t>
             </a:fld>
             <a:endParaRPr lang="en-AU"/>
           </a:p>
@@ -2569,7 +2570,7 @@
           <a:p>
             <a:fld id="{4BC6EA22-CCE4-4220-8B4C-68A9C409F945}" type="datetimeFigureOut">
               <a:rPr lang="en-AU" smtClean="0"/>
-              <a:t>15/6/2024</a:t>
+              <a:t>26/11/2024</a:t>
             </a:fld>
             <a:endParaRPr lang="en-AU"/>
           </a:p>
@@ -2974,54 +2975,12 @@
           <a:chExt cx="0" cy="0"/>
         </a:xfrm>
       </p:grpSpPr>
-      <p:cxnSp>
-        <p:nvCxnSpPr>
-          <p:cNvPr id="36" name="Straight Connector 35">
+      <p:sp>
+        <p:nvSpPr>
+          <p:cNvPr id="2" name="Oval 1">
             <a:extLst>
               <a:ext uri="{FF2B5EF4-FFF2-40B4-BE49-F238E27FC236}">
-                <a16:creationId xmlns:a16="http://schemas.microsoft.com/office/drawing/2014/main" id="{88FE6EE9-02B2-C074-0545-CB8D4C5B331D}"/>
-              </a:ext>
-            </a:extLst>
-          </p:cNvPr>
-          <p:cNvCxnSpPr/>
-          <p:nvPr/>
-        </p:nvCxnSpPr>
-        <p:spPr>
-          <a:xfrm>
-            <a:off x="3106232" y="1046819"/>
-            <a:ext cx="0" cy="3855308"/>
-          </a:xfrm>
-          <a:prstGeom prst="line">
-            <a:avLst/>
-          </a:prstGeom>
-          <a:ln w="76200">
-            <a:solidFill>
-              <a:srgbClr val="00B050"/>
-            </a:solidFill>
-            <a:prstDash val="lgDash"/>
-          </a:ln>
-        </p:spPr>
-        <p:style>
-          <a:lnRef idx="2">
-            <a:schemeClr val="accent1"/>
-          </a:lnRef>
-          <a:fillRef idx="0">
-            <a:schemeClr val="accent1"/>
-          </a:fillRef>
-          <a:effectRef idx="1">
-            <a:schemeClr val="accent1"/>
-          </a:effectRef>
-          <a:fontRef idx="minor">
-            <a:schemeClr val="tx1"/>
-          </a:fontRef>
-        </p:style>
-      </p:cxnSp>
-      <p:sp>
-        <p:nvSpPr>
-          <p:cNvPr id="2" name="Rectangle 1">
-            <a:extLst>
-              <a:ext uri="{FF2B5EF4-FFF2-40B4-BE49-F238E27FC236}">
-                <a16:creationId xmlns:a16="http://schemas.microsoft.com/office/drawing/2014/main" id="{C024CF45-75D7-B54F-7086-284695C7A82B}"/>
+                <a16:creationId xmlns:a16="http://schemas.microsoft.com/office/drawing/2014/main" id="{9FD57B1D-60D8-7230-9B64-B8DBB1E1D8FD}"/>
               </a:ext>
             </a:extLst>
           </p:cNvPr>
@@ -3030,13 +2989,15 @@
         </p:nvSpPr>
         <p:spPr>
           <a:xfrm>
-            <a:off x="417090" y="1136033"/>
-            <a:ext cx="1714500" cy="965200"/>
-          </a:xfrm>
-          <a:prstGeom prst="rect">
+            <a:off x="1573696" y="4757529"/>
+            <a:ext cx="397566" cy="424069"/>
+          </a:xfrm>
+          <a:prstGeom prst="ellipse">
             <a:avLst/>
           </a:prstGeom>
-          <a:noFill/>
+          <a:solidFill>
+            <a:schemeClr val="accent2"/>
+          </a:solidFill>
         </p:spPr>
         <p:style>
           <a:lnRef idx="2">
@@ -3059,34 +3020,16 @@
           <a:lstStyle/>
           <a:p>
             <a:pPr algn="ctr"/>
-            <a:r>
-              <a:rPr lang="en-AU" dirty="0">
-                <a:solidFill>
-                  <a:schemeClr val="tx1"/>
-                </a:solidFill>
-              </a:rPr>
-              <a:t>Phone</a:t>
-            </a:r>
-          </a:p>
-          <a:p>
-            <a:pPr algn="ctr"/>
-            <a:r>
-              <a:rPr lang="en-AU" sz="1200" dirty="0">
-                <a:solidFill>
-                  <a:schemeClr val="tx1"/>
-                </a:solidFill>
-              </a:rPr>
-              <a:t>Video feed</a:t>
-            </a:r>
-          </a:p>
-        </p:txBody>
-      </p:sp>
-      <p:sp>
-        <p:nvSpPr>
-          <p:cNvPr id="3" name="Rectangle 2">
+            <a:endParaRPr lang="en-AU"/>
+          </a:p>
+        </p:txBody>
+      </p:sp>
+      <p:sp>
+        <p:nvSpPr>
+          <p:cNvPr id="3" name="Oval 2">
             <a:extLst>
               <a:ext uri="{FF2B5EF4-FFF2-40B4-BE49-F238E27FC236}">
-                <a16:creationId xmlns:a16="http://schemas.microsoft.com/office/drawing/2014/main" id="{4C60DA63-4E1B-818D-DDDF-7E58127C9E3B}"/>
+                <a16:creationId xmlns:a16="http://schemas.microsoft.com/office/drawing/2014/main" id="{2959E88F-75AB-C062-59B5-121C3D8EC4CF}"/>
               </a:ext>
             </a:extLst>
           </p:cNvPr>
@@ -3095,13 +3038,12 @@
         </p:nvSpPr>
         <p:spPr>
           <a:xfrm>
-            <a:off x="7465419" y="3189666"/>
-            <a:ext cx="1714500" cy="965200"/>
-          </a:xfrm>
-          <a:prstGeom prst="rect">
+            <a:off x="3051313" y="4757530"/>
+            <a:ext cx="397566" cy="424069"/>
+          </a:xfrm>
+          <a:prstGeom prst="ellipse">
             <a:avLst/>
           </a:prstGeom>
-          <a:noFill/>
         </p:spPr>
         <p:style>
           <a:lnRef idx="2">
@@ -3124,45 +3066,16 @@
           <a:lstStyle/>
           <a:p>
             <a:pPr algn="ctr"/>
-            <a:r>
-              <a:rPr lang="en-AU" dirty="0">
-                <a:solidFill>
-                  <a:schemeClr val="tx1"/>
-                </a:solidFill>
-              </a:rPr>
-              <a:t>Path Planner</a:t>
-            </a:r>
-          </a:p>
-          <a:p>
-            <a:pPr algn="ctr"/>
-            <a:r>
-              <a:rPr lang="en-AU" sz="1200" dirty="0">
-                <a:solidFill>
-                  <a:schemeClr val="tx1"/>
-                </a:solidFill>
-              </a:rPr>
-              <a:t>(direction, speed)</a:t>
-            </a:r>
-          </a:p>
-          <a:p>
-            <a:pPr algn="ctr"/>
-            <a:r>
-              <a:rPr lang="en-AU" sz="1200" dirty="0">
-                <a:solidFill>
-                  <a:schemeClr val="tx1"/>
-                </a:solidFill>
-              </a:rPr>
-              <a:t>everyone</a:t>
-            </a:r>
-          </a:p>
-        </p:txBody>
-      </p:sp>
-      <p:sp>
-        <p:nvSpPr>
-          <p:cNvPr id="4" name="Rectangle 3">
+            <a:endParaRPr lang="en-AU"/>
+          </a:p>
+        </p:txBody>
+      </p:sp>
+      <p:sp>
+        <p:nvSpPr>
+          <p:cNvPr id="4" name="Oval 3">
             <a:extLst>
               <a:ext uri="{FF2B5EF4-FFF2-40B4-BE49-F238E27FC236}">
-                <a16:creationId xmlns:a16="http://schemas.microsoft.com/office/drawing/2014/main" id="{0C005588-925B-0C62-35A8-31CE442FFB20}"/>
+                <a16:creationId xmlns:a16="http://schemas.microsoft.com/office/drawing/2014/main" id="{125C65D9-2612-9B7E-6B5E-262EAA155EB6}"/>
               </a:ext>
             </a:extLst>
           </p:cNvPr>
@@ -3171,13 +3084,12 @@
         </p:nvSpPr>
         <p:spPr>
           <a:xfrm>
-            <a:off x="4021659" y="1151539"/>
-            <a:ext cx="2065638" cy="965200"/>
-          </a:xfrm>
-          <a:prstGeom prst="rect">
+            <a:off x="3051313" y="2736572"/>
+            <a:ext cx="397566" cy="424069"/>
+          </a:xfrm>
+          <a:prstGeom prst="ellipse">
             <a:avLst/>
           </a:prstGeom>
-          <a:noFill/>
         </p:spPr>
         <p:style>
           <a:lnRef idx="2">
@@ -3200,58 +3112,16 @@
           <a:lstStyle/>
           <a:p>
             <a:pPr algn="ctr"/>
-            <a:r>
-              <a:rPr lang="en-AU" dirty="0">
-                <a:solidFill>
-                  <a:schemeClr val="tx1"/>
-                </a:solidFill>
-              </a:rPr>
-              <a:t>Colour Mask</a:t>
-            </a:r>
-          </a:p>
-          <a:p>
-            <a:pPr algn="ctr"/>
-            <a:r>
-              <a:rPr lang="en-AU" sz="1200" dirty="0">
-                <a:solidFill>
-                  <a:schemeClr val="tx1"/>
-                </a:solidFill>
-              </a:rPr>
-              <a:t>Output: 3 sets of </a:t>
-            </a:r>
-            <a:r>
-              <a:rPr lang="en-AU" sz="1200" dirty="0" err="1">
-                <a:solidFill>
-                  <a:schemeClr val="tx1"/>
-                </a:solidFill>
-              </a:rPr>
-              <a:t>np.array</a:t>
-            </a:r>
-            <a:endParaRPr lang="en-AU" sz="1200" dirty="0">
-              <a:solidFill>
-                <a:schemeClr val="tx1"/>
-              </a:solidFill>
-            </a:endParaRPr>
-          </a:p>
-          <a:p>
-            <a:pPr algn="ctr"/>
-            <a:r>
-              <a:rPr lang="en-AU" sz="1200" dirty="0">
-                <a:solidFill>
-                  <a:schemeClr val="tx1"/>
-                </a:solidFill>
-              </a:rPr>
-              <a:t>Who: Jack lord</a:t>
-            </a:r>
-          </a:p>
-        </p:txBody>
-      </p:sp>
-      <p:sp>
-        <p:nvSpPr>
-          <p:cNvPr id="5" name="Rectangle 4">
+            <a:endParaRPr lang="en-AU"/>
+          </a:p>
+        </p:txBody>
+      </p:sp>
+      <p:sp>
+        <p:nvSpPr>
+          <p:cNvPr id="5" name="Oval 4">
             <a:extLst>
               <a:ext uri="{FF2B5EF4-FFF2-40B4-BE49-F238E27FC236}">
-                <a16:creationId xmlns:a16="http://schemas.microsoft.com/office/drawing/2014/main" id="{7B3B57CF-C397-B4E0-EB9B-C1B3C0972444}"/>
+                <a16:creationId xmlns:a16="http://schemas.microsoft.com/office/drawing/2014/main" id="{C0DCFD63-9C38-E024-3E11-4E22B790696F}"/>
               </a:ext>
             </a:extLst>
           </p:cNvPr>
@@ -3260,13 +3130,15 @@
         </p:nvSpPr>
         <p:spPr>
           <a:xfrm>
-            <a:off x="7036794" y="1151539"/>
-            <a:ext cx="2571750" cy="965200"/>
-          </a:xfrm>
-          <a:prstGeom prst="rect">
+            <a:off x="1547192" y="2736572"/>
+            <a:ext cx="397566" cy="424069"/>
+          </a:xfrm>
+          <a:prstGeom prst="ellipse">
             <a:avLst/>
           </a:prstGeom>
-          <a:noFill/>
+          <a:solidFill>
+            <a:schemeClr val="accent2"/>
+          </a:solidFill>
         </p:spPr>
         <p:style>
           <a:lnRef idx="2">
@@ -3289,58 +3161,16 @@
           <a:lstStyle/>
           <a:p>
             <a:pPr algn="ctr"/>
-            <a:r>
-              <a:rPr lang="en-AU" dirty="0">
-                <a:solidFill>
-                  <a:schemeClr val="tx1"/>
-                </a:solidFill>
-              </a:rPr>
-              <a:t>Perspective Transform</a:t>
-            </a:r>
-          </a:p>
-          <a:p>
-            <a:pPr algn="ctr"/>
-            <a:r>
-              <a:rPr lang="en-AU" sz="1200" dirty="0">
-                <a:solidFill>
-                  <a:schemeClr val="tx1"/>
-                </a:solidFill>
-              </a:rPr>
-              <a:t>3 sets of </a:t>
-            </a:r>
-            <a:r>
-              <a:rPr lang="en-AU" sz="1200" dirty="0" err="1">
-                <a:solidFill>
-                  <a:schemeClr val="tx1"/>
-                </a:solidFill>
-              </a:rPr>
-              <a:t>np.array</a:t>
-            </a:r>
-            <a:endParaRPr lang="en-AU" sz="1200" dirty="0">
-              <a:solidFill>
-                <a:schemeClr val="tx1"/>
-              </a:solidFill>
-            </a:endParaRPr>
-          </a:p>
-          <a:p>
-            <a:pPr algn="ctr"/>
-            <a:r>
-              <a:rPr lang="en-AU" sz="1200" dirty="0">
-                <a:solidFill>
-                  <a:schemeClr val="tx1"/>
-                </a:solidFill>
-              </a:rPr>
-              <a:t>Bryce</a:t>
-            </a:r>
-          </a:p>
-        </p:txBody>
-      </p:sp>
-      <p:sp>
-        <p:nvSpPr>
-          <p:cNvPr id="6" name="Rectangle 5">
+            <a:endParaRPr lang="en-AU"/>
+          </a:p>
+        </p:txBody>
+      </p:sp>
+      <p:sp>
+        <p:nvSpPr>
+          <p:cNvPr id="6" name="Oval 5">
             <a:extLst>
               <a:ext uri="{FF2B5EF4-FFF2-40B4-BE49-F238E27FC236}">
-                <a16:creationId xmlns:a16="http://schemas.microsoft.com/office/drawing/2014/main" id="{83ED7587-1177-1C38-4B4B-7980CCDB65C8}"/>
+                <a16:creationId xmlns:a16="http://schemas.microsoft.com/office/drawing/2014/main" id="{4EACFF69-20A7-35C6-B6F5-FE50EEDD1BD1}"/>
               </a:ext>
             </a:extLst>
           </p:cNvPr>
@@ -3349,13 +3179,15 @@
         </p:nvSpPr>
         <p:spPr>
           <a:xfrm>
-            <a:off x="3870330" y="3191777"/>
-            <a:ext cx="1714500" cy="965200"/>
-          </a:xfrm>
-          <a:prstGeom prst="rect">
+            <a:off x="3051313" y="288158"/>
+            <a:ext cx="397566" cy="424069"/>
+          </a:xfrm>
+          <a:prstGeom prst="ellipse">
             <a:avLst/>
           </a:prstGeom>
-          <a:noFill/>
+          <a:solidFill>
+            <a:schemeClr val="accent2"/>
+          </a:solidFill>
         </p:spPr>
         <p:style>
           <a:lnRef idx="2">
@@ -3378,45 +3210,16 @@
           <a:lstStyle/>
           <a:p>
             <a:pPr algn="ctr"/>
-            <a:r>
-              <a:rPr lang="en-AU" dirty="0">
-                <a:solidFill>
-                  <a:schemeClr val="tx1"/>
-                </a:solidFill>
-              </a:rPr>
-              <a:t>UART Thread</a:t>
-            </a:r>
-          </a:p>
-          <a:p>
-            <a:pPr algn="ctr"/>
-            <a:r>
-              <a:rPr lang="en-AU" sz="1200" dirty="0">
-                <a:solidFill>
-                  <a:schemeClr val="tx1"/>
-                </a:solidFill>
-              </a:rPr>
-              <a:t>String</a:t>
-            </a:r>
-          </a:p>
-          <a:p>
-            <a:pPr algn="ctr"/>
-            <a:r>
-              <a:rPr lang="en-AU" sz="1200" dirty="0">
-                <a:solidFill>
-                  <a:schemeClr val="tx1"/>
-                </a:solidFill>
-              </a:rPr>
-              <a:t>Jack Zhang</a:t>
-            </a:r>
-          </a:p>
-        </p:txBody>
-      </p:sp>
-      <p:sp>
-        <p:nvSpPr>
-          <p:cNvPr id="7" name="Rectangle 6">
+            <a:endParaRPr lang="en-AU"/>
+          </a:p>
+        </p:txBody>
+      </p:sp>
+      <p:sp>
+        <p:nvSpPr>
+          <p:cNvPr id="7" name="Oval 6">
             <a:extLst>
               <a:ext uri="{FF2B5EF4-FFF2-40B4-BE49-F238E27FC236}">
-                <a16:creationId xmlns:a16="http://schemas.microsoft.com/office/drawing/2014/main" id="{27D40B13-F823-A5AE-5DC7-7FCEE3A60148}"/>
+                <a16:creationId xmlns:a16="http://schemas.microsoft.com/office/drawing/2014/main" id="{EF73F9AE-FF27-1200-40C7-4FD9FCC5F69F}"/>
               </a:ext>
             </a:extLst>
           </p:cNvPr>
@@ -3425,13 +3228,15 @@
         </p:nvSpPr>
         <p:spPr>
           <a:xfrm>
-            <a:off x="427345" y="3200015"/>
-            <a:ext cx="1714500" cy="965200"/>
-          </a:xfrm>
-          <a:prstGeom prst="rect">
+            <a:off x="4555434" y="2736571"/>
+            <a:ext cx="397566" cy="424069"/>
+          </a:xfrm>
+          <a:prstGeom prst="ellipse">
             <a:avLst/>
           </a:prstGeom>
-          <a:noFill/>
+          <a:solidFill>
+            <a:schemeClr val="accent2"/>
+          </a:solidFill>
         </p:spPr>
         <p:style>
           <a:lnRef idx="2">
@@ -3454,45 +3259,174 @@
           <a:lstStyle/>
           <a:p>
             <a:pPr algn="ctr"/>
-            <a:r>
-              <a:rPr lang="en-AU" dirty="0">
-                <a:solidFill>
-                  <a:schemeClr val="tx1"/>
-                </a:solidFill>
-              </a:rPr>
-              <a:t>Car Control</a:t>
-            </a:r>
-          </a:p>
-          <a:p>
-            <a:pPr algn="ctr"/>
-            <a:r>
-              <a:rPr lang="en-AU" sz="1200" dirty="0">
-                <a:solidFill>
-                  <a:schemeClr val="tx1"/>
-                </a:solidFill>
-              </a:rPr>
-              <a:t>Steers the car</a:t>
-            </a:r>
-          </a:p>
-          <a:p>
-            <a:pPr algn="ctr"/>
-            <a:r>
-              <a:rPr lang="en-AU" sz="1200" dirty="0">
-                <a:solidFill>
-                  <a:schemeClr val="tx1"/>
-                </a:solidFill>
-              </a:rPr>
-              <a:t>Jack Zhang</a:t>
-            </a:r>
-          </a:p>
-        </p:txBody>
-      </p:sp>
-      <p:sp>
-        <p:nvSpPr>
-          <p:cNvPr id="8" name="TextBox 7">
+            <a:endParaRPr lang="en-AU"/>
+          </a:p>
+        </p:txBody>
+      </p:sp>
+      <p:sp>
+        <p:nvSpPr>
+          <p:cNvPr id="8" name="Oval 7">
             <a:extLst>
               <a:ext uri="{FF2B5EF4-FFF2-40B4-BE49-F238E27FC236}">
-                <a16:creationId xmlns:a16="http://schemas.microsoft.com/office/drawing/2014/main" id="{AC73690C-A65E-50B6-2BAB-8387DCBDD60F}"/>
+                <a16:creationId xmlns:a16="http://schemas.microsoft.com/office/drawing/2014/main" id="{FFD26F8F-7DAC-8121-BE69-2F7C58ADD84A}"/>
+              </a:ext>
+            </a:extLst>
+          </p:cNvPr>
+          <p:cNvSpPr/>
+          <p:nvPr/>
+        </p:nvSpPr>
+        <p:spPr>
+          <a:xfrm>
+            <a:off x="4555434" y="4757528"/>
+            <a:ext cx="397566" cy="424069"/>
+          </a:xfrm>
+          <a:prstGeom prst="ellipse">
+            <a:avLst/>
+          </a:prstGeom>
+          <a:solidFill>
+            <a:schemeClr val="accent2"/>
+          </a:solidFill>
+        </p:spPr>
+        <p:style>
+          <a:lnRef idx="2">
+            <a:schemeClr val="accent1">
+              <a:shade val="15000"/>
+            </a:schemeClr>
+          </a:lnRef>
+          <a:fillRef idx="1">
+            <a:schemeClr val="accent1"/>
+          </a:fillRef>
+          <a:effectRef idx="0">
+            <a:schemeClr val="accent1"/>
+          </a:effectRef>
+          <a:fontRef idx="minor">
+            <a:schemeClr val="lt1"/>
+          </a:fontRef>
+        </p:style>
+        <p:txBody>
+          <a:bodyPr rtlCol="0" anchor="ctr"/>
+          <a:lstStyle/>
+          <a:p>
+            <a:pPr algn="ctr"/>
+            <a:endParaRPr lang="en-AU"/>
+          </a:p>
+        </p:txBody>
+      </p:sp>
+      <p:sp>
+        <p:nvSpPr>
+          <p:cNvPr id="9" name="Oval 8">
+            <a:extLst>
+              <a:ext uri="{FF2B5EF4-FFF2-40B4-BE49-F238E27FC236}">
+                <a16:creationId xmlns:a16="http://schemas.microsoft.com/office/drawing/2014/main" id="{38443B23-67DB-96E0-5252-FD134E9214DE}"/>
+              </a:ext>
+            </a:extLst>
+          </p:cNvPr>
+          <p:cNvSpPr/>
+          <p:nvPr/>
+        </p:nvSpPr>
+        <p:spPr>
+          <a:xfrm>
+            <a:off x="4157868" y="1139683"/>
+            <a:ext cx="397566" cy="424069"/>
+          </a:xfrm>
+          <a:prstGeom prst="ellipse">
+            <a:avLst/>
+          </a:prstGeom>
+          <a:solidFill>
+            <a:schemeClr val="accent2"/>
+          </a:solidFill>
+        </p:spPr>
+        <p:style>
+          <a:lnRef idx="2">
+            <a:schemeClr val="accent1">
+              <a:shade val="15000"/>
+            </a:schemeClr>
+          </a:lnRef>
+          <a:fillRef idx="1">
+            <a:schemeClr val="accent1"/>
+          </a:fillRef>
+          <a:effectRef idx="0">
+            <a:schemeClr val="accent1"/>
+          </a:effectRef>
+          <a:fontRef idx="minor">
+            <a:schemeClr val="lt1"/>
+          </a:fontRef>
+        </p:style>
+        <p:txBody>
+          <a:bodyPr rtlCol="0" anchor="ctr"/>
+          <a:lstStyle/>
+          <a:p>
+            <a:pPr algn="ctr"/>
+            <a:endParaRPr lang="en-AU"/>
+          </a:p>
+        </p:txBody>
+      </p:sp>
+      <p:sp>
+        <p:nvSpPr>
+          <p:cNvPr id="10" name="Oval 9">
+            <a:extLst>
+              <a:ext uri="{FF2B5EF4-FFF2-40B4-BE49-F238E27FC236}">
+                <a16:creationId xmlns:a16="http://schemas.microsoft.com/office/drawing/2014/main" id="{02C33D74-968B-04CF-A7DB-970C5C732F3D}"/>
+              </a:ext>
+            </a:extLst>
+          </p:cNvPr>
+          <p:cNvSpPr/>
+          <p:nvPr/>
+        </p:nvSpPr>
+        <p:spPr>
+          <a:xfrm>
+            <a:off x="1984514" y="1139683"/>
+            <a:ext cx="397566" cy="424069"/>
+          </a:xfrm>
+          <a:prstGeom prst="ellipse">
+            <a:avLst/>
+          </a:prstGeom>
+          <a:solidFill>
+            <a:schemeClr val="accent2">
+              <a:lumMod val="40000"/>
+              <a:lumOff val="60000"/>
+            </a:schemeClr>
+          </a:solidFill>
+          <a:ln>
+            <a:solidFill>
+              <a:schemeClr val="accent2">
+                <a:lumMod val="60000"/>
+                <a:lumOff val="40000"/>
+              </a:schemeClr>
+            </a:solidFill>
+          </a:ln>
+        </p:spPr>
+        <p:style>
+          <a:lnRef idx="2">
+            <a:schemeClr val="accent1">
+              <a:shade val="15000"/>
+            </a:schemeClr>
+          </a:lnRef>
+          <a:fillRef idx="1">
+            <a:schemeClr val="accent1"/>
+          </a:fillRef>
+          <a:effectRef idx="0">
+            <a:schemeClr val="accent1"/>
+          </a:effectRef>
+          <a:fontRef idx="minor">
+            <a:schemeClr val="lt1"/>
+          </a:fontRef>
+        </p:style>
+        <p:txBody>
+          <a:bodyPr rtlCol="0" anchor="ctr"/>
+          <a:lstStyle/>
+          <a:p>
+            <a:pPr algn="ctr"/>
+            <a:endParaRPr lang="en-AU"/>
+          </a:p>
+        </p:txBody>
+      </p:sp>
+      <p:sp>
+        <p:nvSpPr>
+          <p:cNvPr id="11" name="TextBox 10">
+            <a:extLst>
+              <a:ext uri="{FF2B5EF4-FFF2-40B4-BE49-F238E27FC236}">
+                <a16:creationId xmlns:a16="http://schemas.microsoft.com/office/drawing/2014/main" id="{A4F2D91B-7BD6-17A7-904E-DF293B6B9423}"/>
               </a:ext>
             </a:extLst>
           </p:cNvPr>
@@ -3501,8 +3435,8 @@
         </p:nvSpPr>
         <p:spPr>
           <a:xfrm>
-            <a:off x="554524" y="4957199"/>
-            <a:ext cx="6935263" cy="1384995"/>
+            <a:off x="1875199" y="4414712"/>
+            <a:ext cx="377026" cy="523220"/>
           </a:xfrm>
           <a:prstGeom prst="rect">
             <a:avLst/>
@@ -3510,91 +3444,28 @@
           <a:noFill/>
         </p:spPr>
         <p:txBody>
-          <a:bodyPr wrap="square" rtlCol="0">
+          <a:bodyPr wrap="none" rtlCol="0">
             <a:spAutoFit/>
           </a:bodyPr>
           <a:lstStyle/>
           <a:p>
             <a:r>
-              <a:rPr lang="en-AU" sz="1200" dirty="0"/>
-              <a:t>3 sets: blue, yellow and purple</a:t>
-            </a:r>
-          </a:p>
-          <a:p>
-            <a:r>
-              <a:rPr lang="en-AU" sz="1200" dirty="0" err="1"/>
-              <a:t>Np.array</a:t>
-            </a:r>
-            <a:r>
-              <a:rPr lang="en-AU" sz="1200" dirty="0"/>
-              <a:t>: Python </a:t>
-            </a:r>
-            <a:r>
-              <a:rPr lang="en-AU" sz="1200" dirty="0" err="1"/>
-              <a:t>Numpy</a:t>
-            </a:r>
-            <a:r>
-              <a:rPr lang="en-AU" sz="1200" dirty="0"/>
-              <a:t> arrays. Size NX2, where N is the number of points marking the outline of the colour region. The first column is the x- and second is the y-coordinates of each point.</a:t>
-            </a:r>
-          </a:p>
-          <a:p>
-            <a:r>
-              <a:rPr lang="en-AU" sz="1200" dirty="0"/>
-              <a:t>Direction: Integer in degrees (positive for turning left). direction the path planner tells the car to drive in (</a:t>
-            </a:r>
-            <a:r>
-              <a:rPr lang="el-GR" sz="1200" b="0" i="0" dirty="0">
+              <a:rPr lang="en-AU" sz="2800" dirty="0">
                 <a:solidFill>
-                  <a:srgbClr val="202124"/>
+                  <a:schemeClr val="accent2"/>
                 </a:solidFill>
-                <a:effectLst/>
-                <a:highlight>
-                  <a:srgbClr val="FFFFFF"/>
-                </a:highlight>
-                <a:latin typeface="Google Sans"/>
               </a:rPr>
-              <a:t>Θ</a:t>
-            </a:r>
-            <a:r>
-              <a:rPr lang="en-AU" sz="1200" b="0" i="0" dirty="0">
-                <a:solidFill>
-                  <a:srgbClr val="202124"/>
-                </a:solidFill>
-                <a:effectLst/>
-                <a:highlight>
-                  <a:srgbClr val="FFFFFF"/>
-                </a:highlight>
-                <a:latin typeface="Google Sans"/>
-              </a:rPr>
-              <a:t> in the diagram on the right)</a:t>
-            </a:r>
-          </a:p>
-          <a:p>
-            <a:r>
-              <a:rPr lang="en-AU" sz="1200" dirty="0"/>
-              <a:t>Speed: integer between 0 and 255. The maximum PWM value written to the motors on the car.</a:t>
-            </a:r>
-          </a:p>
-          <a:p>
-            <a:r>
-              <a:rPr lang="en-AU" sz="1200" dirty="0"/>
-              <a:t>Python queue: each element is a string in the format: </a:t>
-            </a:r>
-            <a:r>
-              <a:rPr lang="en-US" sz="1200" dirty="0"/>
-              <a:t>“/ &lt;direction&gt; &lt;speed&gt;”</a:t>
-            </a:r>
-            <a:endParaRPr lang="en-AU" sz="1200" dirty="0"/>
+              <a:t>1</a:t>
+            </a:r>
           </a:p>
         </p:txBody>
       </p:sp>
       <p:pic>
         <p:nvPicPr>
-          <p:cNvPr id="1028" name="Picture 4" descr="Zenith angle (Θ) and the corresponding factor cos(Θ). n = surface... |  Download Scientific Diagram">
+          <p:cNvPr id="1026" name="Picture 2" descr="Car Top View PNG Transparent Images Free Download | Vector ...">
             <a:extLst>
               <a:ext uri="{FF2B5EF4-FFF2-40B4-BE49-F238E27FC236}">
-                <a16:creationId xmlns:a16="http://schemas.microsoft.com/office/drawing/2014/main" id="{E0BC0EDD-8E82-D0E4-102D-117F26E33F93}"/>
+                <a16:creationId xmlns:a16="http://schemas.microsoft.com/office/drawing/2014/main" id="{8F1380A1-5EB7-0AD1-2FF9-27C364713166}"/>
               </a:ext>
             </a:extLst>
           </p:cNvPr>
@@ -3603,21 +3474,32 @@
           </p:cNvPicPr>
           <p:nvPr/>
         </p:nvPicPr>
-        <p:blipFill rotWithShape="1">
+        <p:blipFill>
           <a:blip r:embed="rId2">
             <a:extLst>
+              <a:ext uri="{BEBA8EAE-BF5A-486C-A8C5-ECC9F3942E4B}">
+                <a14:imgProps xmlns:a14="http://schemas.microsoft.com/office/drawing/2010/main">
+                  <a14:imgLayer r:embed="rId3">
+                    <a14:imgEffect>
+                      <a14:backgroundRemoval t="10000" b="90000" l="10000" r="90000"/>
+                    </a14:imgEffect>
+                  </a14:imgLayer>
+                </a14:imgProps>
+              </a:ext>
               <a:ext uri="{28A0092B-C50C-407E-A947-70E740481C1C}">
                 <a14:useLocalDpi xmlns:a14="http://schemas.microsoft.com/office/drawing/2010/main" val="0"/>
               </a:ext>
             </a:extLst>
           </a:blip>
-          <a:srcRect l="36258" r="36798" b="41237"/>
-          <a:stretch/>
+          <a:srcRect/>
+          <a:stretch>
+            <a:fillRect/>
+          </a:stretch>
         </p:blipFill>
         <p:spPr bwMode="auto">
-          <a:xfrm flipH="1">
-            <a:off x="7327649" y="4949324"/>
-            <a:ext cx="2253049" cy="1514273"/>
+          <a:xfrm>
+            <a:off x="1875199" y="5344012"/>
+            <a:ext cx="1282141" cy="1282141"/>
           </a:xfrm>
           <a:prstGeom prst="rect">
             <a:avLst/>
@@ -3636,6 +3518,969 @@
       </p:pic>
       <p:sp>
         <p:nvSpPr>
+          <p:cNvPr id="12" name="TextBox 11">
+            <a:extLst>
+              <a:ext uri="{FF2B5EF4-FFF2-40B4-BE49-F238E27FC236}">
+                <a16:creationId xmlns:a16="http://schemas.microsoft.com/office/drawing/2014/main" id="{FBE273EE-F496-D0F4-EFD1-34AB173AAC06}"/>
+              </a:ext>
+            </a:extLst>
+          </p:cNvPr>
+          <p:cNvSpPr txBox="1"/>
+          <p:nvPr/>
+        </p:nvSpPr>
+        <p:spPr>
+          <a:xfrm>
+            <a:off x="1865590" y="2378807"/>
+            <a:ext cx="377026" cy="523220"/>
+          </a:xfrm>
+          <a:prstGeom prst="rect">
+            <a:avLst/>
+          </a:prstGeom>
+          <a:noFill/>
+        </p:spPr>
+        <p:txBody>
+          <a:bodyPr wrap="none" rtlCol="0">
+            <a:spAutoFit/>
+          </a:bodyPr>
+          <a:lstStyle/>
+          <a:p>
+            <a:r>
+              <a:rPr lang="en-AU" sz="2800" dirty="0">
+                <a:solidFill>
+                  <a:schemeClr val="accent2"/>
+                </a:solidFill>
+              </a:rPr>
+              <a:t>2</a:t>
+            </a:r>
+          </a:p>
+        </p:txBody>
+      </p:sp>
+      <p:sp>
+        <p:nvSpPr>
+          <p:cNvPr id="13" name="TextBox 12">
+            <a:extLst>
+              <a:ext uri="{FF2B5EF4-FFF2-40B4-BE49-F238E27FC236}">
+                <a16:creationId xmlns:a16="http://schemas.microsoft.com/office/drawing/2014/main" id="{36591B42-1D68-D24B-23C6-77051C4ACB98}"/>
+              </a:ext>
+            </a:extLst>
+          </p:cNvPr>
+          <p:cNvSpPr txBox="1"/>
+          <p:nvPr/>
+        </p:nvSpPr>
+        <p:spPr>
+          <a:xfrm>
+            <a:off x="3551599" y="238582"/>
+            <a:ext cx="377026" cy="523220"/>
+          </a:xfrm>
+          <a:prstGeom prst="rect">
+            <a:avLst/>
+          </a:prstGeom>
+          <a:noFill/>
+        </p:spPr>
+        <p:txBody>
+          <a:bodyPr wrap="none" rtlCol="0">
+            <a:spAutoFit/>
+          </a:bodyPr>
+          <a:lstStyle/>
+          <a:p>
+            <a:r>
+              <a:rPr lang="en-AU" sz="2800" dirty="0">
+                <a:solidFill>
+                  <a:schemeClr val="accent2"/>
+                </a:solidFill>
+              </a:rPr>
+              <a:t>3</a:t>
+            </a:r>
+          </a:p>
+        </p:txBody>
+      </p:sp>
+      <p:sp>
+        <p:nvSpPr>
+          <p:cNvPr id="14" name="TextBox 13">
+            <a:extLst>
+              <a:ext uri="{FF2B5EF4-FFF2-40B4-BE49-F238E27FC236}">
+                <a16:creationId xmlns:a16="http://schemas.microsoft.com/office/drawing/2014/main" id="{2F0D0E81-E390-79C9-4CCE-B53DC55BFA8D}"/>
+              </a:ext>
+            </a:extLst>
+          </p:cNvPr>
+          <p:cNvSpPr txBox="1"/>
+          <p:nvPr/>
+        </p:nvSpPr>
+        <p:spPr>
+          <a:xfrm>
+            <a:off x="4724401" y="1090107"/>
+            <a:ext cx="377026" cy="523220"/>
+          </a:xfrm>
+          <a:prstGeom prst="rect">
+            <a:avLst/>
+          </a:prstGeom>
+          <a:noFill/>
+        </p:spPr>
+        <p:txBody>
+          <a:bodyPr wrap="none" rtlCol="0">
+            <a:spAutoFit/>
+          </a:bodyPr>
+          <a:lstStyle/>
+          <a:p>
+            <a:r>
+              <a:rPr lang="en-AU" sz="2800" dirty="0">
+                <a:solidFill>
+                  <a:schemeClr val="accent2"/>
+                </a:solidFill>
+              </a:rPr>
+              <a:t>4</a:t>
+            </a:r>
+          </a:p>
+        </p:txBody>
+      </p:sp>
+      <p:sp>
+        <p:nvSpPr>
+          <p:cNvPr id="15" name="TextBox 14">
+            <a:extLst>
+              <a:ext uri="{FF2B5EF4-FFF2-40B4-BE49-F238E27FC236}">
+                <a16:creationId xmlns:a16="http://schemas.microsoft.com/office/drawing/2014/main" id="{D44CC852-2548-6190-5C39-AB4BD35AED4D}"/>
+              </a:ext>
+            </a:extLst>
+          </p:cNvPr>
+          <p:cNvSpPr txBox="1"/>
+          <p:nvPr/>
+        </p:nvSpPr>
+        <p:spPr>
+          <a:xfrm>
+            <a:off x="5071611" y="2686995"/>
+            <a:ext cx="377026" cy="523220"/>
+          </a:xfrm>
+          <a:prstGeom prst="rect">
+            <a:avLst/>
+          </a:prstGeom>
+          <a:noFill/>
+        </p:spPr>
+        <p:txBody>
+          <a:bodyPr wrap="none" rtlCol="0">
+            <a:spAutoFit/>
+          </a:bodyPr>
+          <a:lstStyle/>
+          <a:p>
+            <a:r>
+              <a:rPr lang="en-AU" sz="2800" dirty="0">
+                <a:solidFill>
+                  <a:schemeClr val="accent2"/>
+                </a:solidFill>
+              </a:rPr>
+              <a:t>5</a:t>
+            </a:r>
+          </a:p>
+        </p:txBody>
+      </p:sp>
+      <p:sp>
+        <p:nvSpPr>
+          <p:cNvPr id="16" name="TextBox 15">
+            <a:extLst>
+              <a:ext uri="{FF2B5EF4-FFF2-40B4-BE49-F238E27FC236}">
+                <a16:creationId xmlns:a16="http://schemas.microsoft.com/office/drawing/2014/main" id="{1C0DDDEF-4359-8FBD-AD22-A5854EEB7064}"/>
+              </a:ext>
+            </a:extLst>
+          </p:cNvPr>
+          <p:cNvSpPr txBox="1"/>
+          <p:nvPr/>
+        </p:nvSpPr>
+        <p:spPr>
+          <a:xfrm>
+            <a:off x="5071611" y="4729328"/>
+            <a:ext cx="377026" cy="523220"/>
+          </a:xfrm>
+          <a:prstGeom prst="rect">
+            <a:avLst/>
+          </a:prstGeom>
+          <a:noFill/>
+        </p:spPr>
+        <p:txBody>
+          <a:bodyPr wrap="none" rtlCol="0">
+            <a:spAutoFit/>
+          </a:bodyPr>
+          <a:lstStyle/>
+          <a:p>
+            <a:r>
+              <a:rPr lang="en-AU" sz="2800" dirty="0">
+                <a:solidFill>
+                  <a:schemeClr val="accent2"/>
+                </a:solidFill>
+              </a:rPr>
+              <a:t>6</a:t>
+            </a:r>
+          </a:p>
+        </p:txBody>
+      </p:sp>
+      <p:sp>
+        <p:nvSpPr>
+          <p:cNvPr id="17" name="TextBox 16">
+            <a:extLst>
+              <a:ext uri="{FF2B5EF4-FFF2-40B4-BE49-F238E27FC236}">
+                <a16:creationId xmlns:a16="http://schemas.microsoft.com/office/drawing/2014/main" id="{3FC5A4EF-B927-87EC-535A-2507EE683D10}"/>
+              </a:ext>
+            </a:extLst>
+          </p:cNvPr>
+          <p:cNvSpPr txBox="1"/>
+          <p:nvPr/>
+        </p:nvSpPr>
+        <p:spPr>
+          <a:xfrm>
+            <a:off x="3528094" y="2683560"/>
+            <a:ext cx="377026" cy="523220"/>
+          </a:xfrm>
+          <a:prstGeom prst="rect">
+            <a:avLst/>
+          </a:prstGeom>
+          <a:noFill/>
+        </p:spPr>
+        <p:txBody>
+          <a:bodyPr wrap="none" rtlCol="0">
+            <a:spAutoFit/>
+          </a:bodyPr>
+          <a:lstStyle/>
+          <a:p>
+            <a:r>
+              <a:rPr lang="en-AU" sz="2800" dirty="0">
+                <a:solidFill>
+                  <a:schemeClr val="accent2"/>
+                </a:solidFill>
+              </a:rPr>
+              <a:t>7</a:t>
+            </a:r>
+          </a:p>
+        </p:txBody>
+      </p:sp>
+      <p:sp>
+        <p:nvSpPr>
+          <p:cNvPr id="18" name="TextBox 17">
+            <a:extLst>
+              <a:ext uri="{FF2B5EF4-FFF2-40B4-BE49-F238E27FC236}">
+                <a16:creationId xmlns:a16="http://schemas.microsoft.com/office/drawing/2014/main" id="{48D22D7F-56EF-6E64-FEDA-B53D5378185E}"/>
+              </a:ext>
+            </a:extLst>
+          </p:cNvPr>
+          <p:cNvSpPr txBox="1"/>
+          <p:nvPr/>
+        </p:nvSpPr>
+        <p:spPr>
+          <a:xfrm>
+            <a:off x="3528094" y="4729328"/>
+            <a:ext cx="377026" cy="523220"/>
+          </a:xfrm>
+          <a:prstGeom prst="rect">
+            <a:avLst/>
+          </a:prstGeom>
+          <a:noFill/>
+        </p:spPr>
+        <p:txBody>
+          <a:bodyPr wrap="none" rtlCol="0">
+            <a:spAutoFit/>
+          </a:bodyPr>
+          <a:lstStyle/>
+          <a:p>
+            <a:r>
+              <a:rPr lang="en-AU" sz="2800" dirty="0">
+                <a:solidFill>
+                  <a:schemeClr val="accent2"/>
+                </a:solidFill>
+              </a:rPr>
+              <a:t>7</a:t>
+            </a:r>
+          </a:p>
+        </p:txBody>
+      </p:sp>
+    </p:spTree>
+    <p:extLst>
+      <p:ext uri="{BB962C8B-B14F-4D97-AF65-F5344CB8AC3E}">
+        <p14:creationId xmlns:p14="http://schemas.microsoft.com/office/powerpoint/2010/main" val="1605068554"/>
+      </p:ext>
+    </p:extLst>
+  </p:cSld>
+  <p:clrMapOvr>
+    <a:masterClrMapping/>
+  </p:clrMapOvr>
+</p:sld>
+</file>
+
+<file path=ppt/slides/slide2.xml><?xml version="1.0" encoding="utf-8"?>
+<p:sld xmlns:a="http://schemas.openxmlformats.org/drawingml/2006/main" xmlns:r="http://schemas.openxmlformats.org/officeDocument/2006/relationships" xmlns:p="http://schemas.openxmlformats.org/presentationml/2006/main">
+  <p:cSld>
+    <p:spTree>
+      <p:nvGrpSpPr>
+        <p:cNvPr id="1" name=""/>
+        <p:cNvGrpSpPr/>
+        <p:nvPr/>
+      </p:nvGrpSpPr>
+      <p:grpSpPr>
+        <a:xfrm>
+          <a:off x="0" y="0"/>
+          <a:ext cx="0" cy="0"/>
+          <a:chOff x="0" y="0"/>
+          <a:chExt cx="0" cy="0"/>
+        </a:xfrm>
+      </p:grpSpPr>
+      <p:cxnSp>
+        <p:nvCxnSpPr>
+          <p:cNvPr id="36" name="Straight Connector 35">
+            <a:extLst>
+              <a:ext uri="{FF2B5EF4-FFF2-40B4-BE49-F238E27FC236}">
+                <a16:creationId xmlns:a16="http://schemas.microsoft.com/office/drawing/2014/main" id="{88FE6EE9-02B2-C074-0545-CB8D4C5B331D}"/>
+              </a:ext>
+            </a:extLst>
+          </p:cNvPr>
+          <p:cNvCxnSpPr/>
+          <p:nvPr/>
+        </p:nvCxnSpPr>
+        <p:spPr>
+          <a:xfrm>
+            <a:off x="3106232" y="1046819"/>
+            <a:ext cx="0" cy="3855308"/>
+          </a:xfrm>
+          <a:prstGeom prst="line">
+            <a:avLst/>
+          </a:prstGeom>
+          <a:ln w="76200">
+            <a:solidFill>
+              <a:srgbClr val="00B050"/>
+            </a:solidFill>
+            <a:prstDash val="lgDash"/>
+          </a:ln>
+        </p:spPr>
+        <p:style>
+          <a:lnRef idx="2">
+            <a:schemeClr val="accent1"/>
+          </a:lnRef>
+          <a:fillRef idx="0">
+            <a:schemeClr val="accent1"/>
+          </a:fillRef>
+          <a:effectRef idx="1">
+            <a:schemeClr val="accent1"/>
+          </a:effectRef>
+          <a:fontRef idx="minor">
+            <a:schemeClr val="tx1"/>
+          </a:fontRef>
+        </p:style>
+      </p:cxnSp>
+      <p:sp>
+        <p:nvSpPr>
+          <p:cNvPr id="2" name="Rectangle 1">
+            <a:extLst>
+              <a:ext uri="{FF2B5EF4-FFF2-40B4-BE49-F238E27FC236}">
+                <a16:creationId xmlns:a16="http://schemas.microsoft.com/office/drawing/2014/main" id="{C024CF45-75D7-B54F-7086-284695C7A82B}"/>
+              </a:ext>
+            </a:extLst>
+          </p:cNvPr>
+          <p:cNvSpPr/>
+          <p:nvPr/>
+        </p:nvSpPr>
+        <p:spPr>
+          <a:xfrm>
+            <a:off x="417090" y="1136033"/>
+            <a:ext cx="1714500" cy="965200"/>
+          </a:xfrm>
+          <a:prstGeom prst="rect">
+            <a:avLst/>
+          </a:prstGeom>
+          <a:noFill/>
+        </p:spPr>
+        <p:style>
+          <a:lnRef idx="2">
+            <a:schemeClr val="accent1">
+              <a:shade val="15000"/>
+            </a:schemeClr>
+          </a:lnRef>
+          <a:fillRef idx="1">
+            <a:schemeClr val="accent1"/>
+          </a:fillRef>
+          <a:effectRef idx="0">
+            <a:schemeClr val="accent1"/>
+          </a:effectRef>
+          <a:fontRef idx="minor">
+            <a:schemeClr val="lt1"/>
+          </a:fontRef>
+        </p:style>
+        <p:txBody>
+          <a:bodyPr rtlCol="0" anchor="ctr"/>
+          <a:lstStyle/>
+          <a:p>
+            <a:pPr algn="ctr"/>
+            <a:r>
+              <a:rPr lang="en-AU" dirty="0">
+                <a:solidFill>
+                  <a:schemeClr val="tx1"/>
+                </a:solidFill>
+              </a:rPr>
+              <a:t>Phone</a:t>
+            </a:r>
+          </a:p>
+          <a:p>
+            <a:pPr algn="ctr"/>
+            <a:r>
+              <a:rPr lang="en-AU" sz="1200" dirty="0">
+                <a:solidFill>
+                  <a:schemeClr val="tx1"/>
+                </a:solidFill>
+              </a:rPr>
+              <a:t>Video feed</a:t>
+            </a:r>
+          </a:p>
+        </p:txBody>
+      </p:sp>
+      <p:sp>
+        <p:nvSpPr>
+          <p:cNvPr id="3" name="Rectangle 2">
+            <a:extLst>
+              <a:ext uri="{FF2B5EF4-FFF2-40B4-BE49-F238E27FC236}">
+                <a16:creationId xmlns:a16="http://schemas.microsoft.com/office/drawing/2014/main" id="{4C60DA63-4E1B-818D-DDDF-7E58127C9E3B}"/>
+              </a:ext>
+            </a:extLst>
+          </p:cNvPr>
+          <p:cNvSpPr/>
+          <p:nvPr/>
+        </p:nvSpPr>
+        <p:spPr>
+          <a:xfrm>
+            <a:off x="7465419" y="3189666"/>
+            <a:ext cx="1714500" cy="965200"/>
+          </a:xfrm>
+          <a:prstGeom prst="rect">
+            <a:avLst/>
+          </a:prstGeom>
+          <a:noFill/>
+        </p:spPr>
+        <p:style>
+          <a:lnRef idx="2">
+            <a:schemeClr val="accent1">
+              <a:shade val="15000"/>
+            </a:schemeClr>
+          </a:lnRef>
+          <a:fillRef idx="1">
+            <a:schemeClr val="accent1"/>
+          </a:fillRef>
+          <a:effectRef idx="0">
+            <a:schemeClr val="accent1"/>
+          </a:effectRef>
+          <a:fontRef idx="minor">
+            <a:schemeClr val="lt1"/>
+          </a:fontRef>
+        </p:style>
+        <p:txBody>
+          <a:bodyPr rtlCol="0" anchor="ctr"/>
+          <a:lstStyle/>
+          <a:p>
+            <a:pPr algn="ctr"/>
+            <a:r>
+              <a:rPr lang="en-AU" dirty="0">
+                <a:solidFill>
+                  <a:schemeClr val="tx1"/>
+                </a:solidFill>
+              </a:rPr>
+              <a:t>Path Planner</a:t>
+            </a:r>
+          </a:p>
+          <a:p>
+            <a:pPr algn="ctr"/>
+            <a:r>
+              <a:rPr lang="en-AU" sz="1200" dirty="0">
+                <a:solidFill>
+                  <a:schemeClr val="tx1"/>
+                </a:solidFill>
+              </a:rPr>
+              <a:t>(direction, speed)</a:t>
+            </a:r>
+          </a:p>
+          <a:p>
+            <a:pPr algn="ctr"/>
+            <a:r>
+              <a:rPr lang="en-AU" sz="1200" dirty="0">
+                <a:solidFill>
+                  <a:schemeClr val="tx1"/>
+                </a:solidFill>
+              </a:rPr>
+              <a:t>everyone</a:t>
+            </a:r>
+          </a:p>
+        </p:txBody>
+      </p:sp>
+      <p:sp>
+        <p:nvSpPr>
+          <p:cNvPr id="4" name="Rectangle 3">
+            <a:extLst>
+              <a:ext uri="{FF2B5EF4-FFF2-40B4-BE49-F238E27FC236}">
+                <a16:creationId xmlns:a16="http://schemas.microsoft.com/office/drawing/2014/main" id="{0C005588-925B-0C62-35A8-31CE442FFB20}"/>
+              </a:ext>
+            </a:extLst>
+          </p:cNvPr>
+          <p:cNvSpPr/>
+          <p:nvPr/>
+        </p:nvSpPr>
+        <p:spPr>
+          <a:xfrm>
+            <a:off x="4021659" y="1151539"/>
+            <a:ext cx="2065638" cy="965200"/>
+          </a:xfrm>
+          <a:prstGeom prst="rect">
+            <a:avLst/>
+          </a:prstGeom>
+          <a:noFill/>
+        </p:spPr>
+        <p:style>
+          <a:lnRef idx="2">
+            <a:schemeClr val="accent1">
+              <a:shade val="15000"/>
+            </a:schemeClr>
+          </a:lnRef>
+          <a:fillRef idx="1">
+            <a:schemeClr val="accent1"/>
+          </a:fillRef>
+          <a:effectRef idx="0">
+            <a:schemeClr val="accent1"/>
+          </a:effectRef>
+          <a:fontRef idx="minor">
+            <a:schemeClr val="lt1"/>
+          </a:fontRef>
+        </p:style>
+        <p:txBody>
+          <a:bodyPr rtlCol="0" anchor="ctr"/>
+          <a:lstStyle/>
+          <a:p>
+            <a:pPr algn="ctr"/>
+            <a:r>
+              <a:rPr lang="en-AU" dirty="0">
+                <a:solidFill>
+                  <a:schemeClr val="tx1"/>
+                </a:solidFill>
+              </a:rPr>
+              <a:t>Colour Mask</a:t>
+            </a:r>
+          </a:p>
+          <a:p>
+            <a:pPr algn="ctr"/>
+            <a:r>
+              <a:rPr lang="en-AU" sz="1200" dirty="0">
+                <a:solidFill>
+                  <a:schemeClr val="tx1"/>
+                </a:solidFill>
+              </a:rPr>
+              <a:t>Output: 3 sets of </a:t>
+            </a:r>
+            <a:r>
+              <a:rPr lang="en-AU" sz="1200" dirty="0" err="1">
+                <a:solidFill>
+                  <a:schemeClr val="tx1"/>
+                </a:solidFill>
+              </a:rPr>
+              <a:t>np.array</a:t>
+            </a:r>
+            <a:endParaRPr lang="en-AU" sz="1200" dirty="0">
+              <a:solidFill>
+                <a:schemeClr val="tx1"/>
+              </a:solidFill>
+            </a:endParaRPr>
+          </a:p>
+          <a:p>
+            <a:pPr algn="ctr"/>
+            <a:r>
+              <a:rPr lang="en-AU" sz="1200" dirty="0">
+                <a:solidFill>
+                  <a:schemeClr val="tx1"/>
+                </a:solidFill>
+              </a:rPr>
+              <a:t>Who: Jack lord</a:t>
+            </a:r>
+          </a:p>
+        </p:txBody>
+      </p:sp>
+      <p:sp>
+        <p:nvSpPr>
+          <p:cNvPr id="5" name="Rectangle 4">
+            <a:extLst>
+              <a:ext uri="{FF2B5EF4-FFF2-40B4-BE49-F238E27FC236}">
+                <a16:creationId xmlns:a16="http://schemas.microsoft.com/office/drawing/2014/main" id="{7B3B57CF-C397-B4E0-EB9B-C1B3C0972444}"/>
+              </a:ext>
+            </a:extLst>
+          </p:cNvPr>
+          <p:cNvSpPr/>
+          <p:nvPr/>
+        </p:nvSpPr>
+        <p:spPr>
+          <a:xfrm>
+            <a:off x="7036794" y="1151539"/>
+            <a:ext cx="2571750" cy="965200"/>
+          </a:xfrm>
+          <a:prstGeom prst="rect">
+            <a:avLst/>
+          </a:prstGeom>
+          <a:noFill/>
+        </p:spPr>
+        <p:style>
+          <a:lnRef idx="2">
+            <a:schemeClr val="accent1">
+              <a:shade val="15000"/>
+            </a:schemeClr>
+          </a:lnRef>
+          <a:fillRef idx="1">
+            <a:schemeClr val="accent1"/>
+          </a:fillRef>
+          <a:effectRef idx="0">
+            <a:schemeClr val="accent1"/>
+          </a:effectRef>
+          <a:fontRef idx="minor">
+            <a:schemeClr val="lt1"/>
+          </a:fontRef>
+        </p:style>
+        <p:txBody>
+          <a:bodyPr rtlCol="0" anchor="ctr"/>
+          <a:lstStyle/>
+          <a:p>
+            <a:pPr algn="ctr"/>
+            <a:r>
+              <a:rPr lang="en-AU" dirty="0">
+                <a:solidFill>
+                  <a:schemeClr val="tx1"/>
+                </a:solidFill>
+              </a:rPr>
+              <a:t>Perspective Transform</a:t>
+            </a:r>
+          </a:p>
+          <a:p>
+            <a:pPr algn="ctr"/>
+            <a:r>
+              <a:rPr lang="en-AU" sz="1200" dirty="0">
+                <a:solidFill>
+                  <a:schemeClr val="tx1"/>
+                </a:solidFill>
+              </a:rPr>
+              <a:t>3 sets of </a:t>
+            </a:r>
+            <a:r>
+              <a:rPr lang="en-AU" sz="1200" dirty="0" err="1">
+                <a:solidFill>
+                  <a:schemeClr val="tx1"/>
+                </a:solidFill>
+              </a:rPr>
+              <a:t>np.array</a:t>
+            </a:r>
+            <a:endParaRPr lang="en-AU" sz="1200" dirty="0">
+              <a:solidFill>
+                <a:schemeClr val="tx1"/>
+              </a:solidFill>
+            </a:endParaRPr>
+          </a:p>
+          <a:p>
+            <a:pPr algn="ctr"/>
+            <a:r>
+              <a:rPr lang="en-AU" sz="1200" dirty="0">
+                <a:solidFill>
+                  <a:schemeClr val="tx1"/>
+                </a:solidFill>
+              </a:rPr>
+              <a:t>Bryce</a:t>
+            </a:r>
+          </a:p>
+        </p:txBody>
+      </p:sp>
+      <p:sp>
+        <p:nvSpPr>
+          <p:cNvPr id="6" name="Rectangle 5">
+            <a:extLst>
+              <a:ext uri="{FF2B5EF4-FFF2-40B4-BE49-F238E27FC236}">
+                <a16:creationId xmlns:a16="http://schemas.microsoft.com/office/drawing/2014/main" id="{83ED7587-1177-1C38-4B4B-7980CCDB65C8}"/>
+              </a:ext>
+            </a:extLst>
+          </p:cNvPr>
+          <p:cNvSpPr/>
+          <p:nvPr/>
+        </p:nvSpPr>
+        <p:spPr>
+          <a:xfrm>
+            <a:off x="3870330" y="3191777"/>
+            <a:ext cx="1714500" cy="965200"/>
+          </a:xfrm>
+          <a:prstGeom prst="rect">
+            <a:avLst/>
+          </a:prstGeom>
+          <a:noFill/>
+        </p:spPr>
+        <p:style>
+          <a:lnRef idx="2">
+            <a:schemeClr val="accent1">
+              <a:shade val="15000"/>
+            </a:schemeClr>
+          </a:lnRef>
+          <a:fillRef idx="1">
+            <a:schemeClr val="accent1"/>
+          </a:fillRef>
+          <a:effectRef idx="0">
+            <a:schemeClr val="accent1"/>
+          </a:effectRef>
+          <a:fontRef idx="minor">
+            <a:schemeClr val="lt1"/>
+          </a:fontRef>
+        </p:style>
+        <p:txBody>
+          <a:bodyPr rtlCol="0" anchor="ctr"/>
+          <a:lstStyle/>
+          <a:p>
+            <a:pPr algn="ctr"/>
+            <a:r>
+              <a:rPr lang="en-AU" dirty="0">
+                <a:solidFill>
+                  <a:schemeClr val="tx1"/>
+                </a:solidFill>
+              </a:rPr>
+              <a:t>UART Thread</a:t>
+            </a:r>
+          </a:p>
+          <a:p>
+            <a:pPr algn="ctr"/>
+            <a:r>
+              <a:rPr lang="en-AU" sz="1200" dirty="0">
+                <a:solidFill>
+                  <a:schemeClr val="tx1"/>
+                </a:solidFill>
+              </a:rPr>
+              <a:t>String</a:t>
+            </a:r>
+          </a:p>
+          <a:p>
+            <a:pPr algn="ctr"/>
+            <a:r>
+              <a:rPr lang="en-AU" sz="1200" dirty="0">
+                <a:solidFill>
+                  <a:schemeClr val="tx1"/>
+                </a:solidFill>
+              </a:rPr>
+              <a:t>Jack Zhang</a:t>
+            </a:r>
+          </a:p>
+        </p:txBody>
+      </p:sp>
+      <p:sp>
+        <p:nvSpPr>
+          <p:cNvPr id="7" name="Rectangle 6">
+            <a:extLst>
+              <a:ext uri="{FF2B5EF4-FFF2-40B4-BE49-F238E27FC236}">
+                <a16:creationId xmlns:a16="http://schemas.microsoft.com/office/drawing/2014/main" id="{27D40B13-F823-A5AE-5DC7-7FCEE3A60148}"/>
+              </a:ext>
+            </a:extLst>
+          </p:cNvPr>
+          <p:cNvSpPr/>
+          <p:nvPr/>
+        </p:nvSpPr>
+        <p:spPr>
+          <a:xfrm>
+            <a:off x="427345" y="3200015"/>
+            <a:ext cx="1714500" cy="965200"/>
+          </a:xfrm>
+          <a:prstGeom prst="rect">
+            <a:avLst/>
+          </a:prstGeom>
+          <a:noFill/>
+        </p:spPr>
+        <p:style>
+          <a:lnRef idx="2">
+            <a:schemeClr val="accent1">
+              <a:shade val="15000"/>
+            </a:schemeClr>
+          </a:lnRef>
+          <a:fillRef idx="1">
+            <a:schemeClr val="accent1"/>
+          </a:fillRef>
+          <a:effectRef idx="0">
+            <a:schemeClr val="accent1"/>
+          </a:effectRef>
+          <a:fontRef idx="minor">
+            <a:schemeClr val="lt1"/>
+          </a:fontRef>
+        </p:style>
+        <p:txBody>
+          <a:bodyPr rtlCol="0" anchor="ctr"/>
+          <a:lstStyle/>
+          <a:p>
+            <a:pPr algn="ctr"/>
+            <a:r>
+              <a:rPr lang="en-AU" dirty="0">
+                <a:solidFill>
+                  <a:schemeClr val="tx1"/>
+                </a:solidFill>
+              </a:rPr>
+              <a:t>Car Control</a:t>
+            </a:r>
+          </a:p>
+          <a:p>
+            <a:pPr algn="ctr"/>
+            <a:r>
+              <a:rPr lang="en-AU" sz="1200" dirty="0">
+                <a:solidFill>
+                  <a:schemeClr val="tx1"/>
+                </a:solidFill>
+              </a:rPr>
+              <a:t>Steers the car</a:t>
+            </a:r>
+          </a:p>
+          <a:p>
+            <a:pPr algn="ctr"/>
+            <a:r>
+              <a:rPr lang="en-AU" sz="1200" dirty="0">
+                <a:solidFill>
+                  <a:schemeClr val="tx1"/>
+                </a:solidFill>
+              </a:rPr>
+              <a:t>Jack Zhang</a:t>
+            </a:r>
+          </a:p>
+        </p:txBody>
+      </p:sp>
+      <p:sp>
+        <p:nvSpPr>
+          <p:cNvPr id="8" name="TextBox 7">
+            <a:extLst>
+              <a:ext uri="{FF2B5EF4-FFF2-40B4-BE49-F238E27FC236}">
+                <a16:creationId xmlns:a16="http://schemas.microsoft.com/office/drawing/2014/main" id="{AC73690C-A65E-50B6-2BAB-8387DCBDD60F}"/>
+              </a:ext>
+            </a:extLst>
+          </p:cNvPr>
+          <p:cNvSpPr txBox="1"/>
+          <p:nvPr/>
+        </p:nvSpPr>
+        <p:spPr>
+          <a:xfrm>
+            <a:off x="554524" y="4957199"/>
+            <a:ext cx="6935263" cy="1384995"/>
+          </a:xfrm>
+          <a:prstGeom prst="rect">
+            <a:avLst/>
+          </a:prstGeom>
+          <a:noFill/>
+        </p:spPr>
+        <p:txBody>
+          <a:bodyPr wrap="square" rtlCol="0">
+            <a:spAutoFit/>
+          </a:bodyPr>
+          <a:lstStyle/>
+          <a:p>
+            <a:r>
+              <a:rPr lang="en-AU" sz="1200" dirty="0"/>
+              <a:t>3 sets: blue, yellow and purple</a:t>
+            </a:r>
+          </a:p>
+          <a:p>
+            <a:r>
+              <a:rPr lang="en-AU" sz="1200" dirty="0" err="1"/>
+              <a:t>Np.array</a:t>
+            </a:r>
+            <a:r>
+              <a:rPr lang="en-AU" sz="1200" dirty="0"/>
+              <a:t>: Python </a:t>
+            </a:r>
+            <a:r>
+              <a:rPr lang="en-AU" sz="1200" dirty="0" err="1"/>
+              <a:t>Numpy</a:t>
+            </a:r>
+            <a:r>
+              <a:rPr lang="en-AU" sz="1200" dirty="0"/>
+              <a:t> arrays. Size NX2, where N is the number of points marking the outline of the colour region. The first column is the x- and second is the y-coordinates of each point.</a:t>
+            </a:r>
+          </a:p>
+          <a:p>
+            <a:r>
+              <a:rPr lang="en-AU" sz="1200" dirty="0"/>
+              <a:t>Direction: Integer in degrees (positive for turning left). direction the path planner tells the car to drive in (</a:t>
+            </a:r>
+            <a:r>
+              <a:rPr lang="el-GR" sz="1200" b="0" i="0" dirty="0">
+                <a:solidFill>
+                  <a:srgbClr val="202124"/>
+                </a:solidFill>
+                <a:effectLst/>
+                <a:highlight>
+                  <a:srgbClr val="FFFFFF"/>
+                </a:highlight>
+                <a:latin typeface="Google Sans"/>
+              </a:rPr>
+              <a:t>Θ</a:t>
+            </a:r>
+            <a:r>
+              <a:rPr lang="en-AU" sz="1200" b="0" i="0" dirty="0">
+                <a:solidFill>
+                  <a:srgbClr val="202124"/>
+                </a:solidFill>
+                <a:effectLst/>
+                <a:highlight>
+                  <a:srgbClr val="FFFFFF"/>
+                </a:highlight>
+                <a:latin typeface="Google Sans"/>
+              </a:rPr>
+              <a:t> in the diagram on the right)</a:t>
+            </a:r>
+          </a:p>
+          <a:p>
+            <a:r>
+              <a:rPr lang="en-AU" sz="1200" dirty="0"/>
+              <a:t>Speed: integer between 0 and 255. The maximum PWM value written to the motors on the car.</a:t>
+            </a:r>
+          </a:p>
+          <a:p>
+            <a:r>
+              <a:rPr lang="en-AU" sz="1200" dirty="0"/>
+              <a:t>Python queue: each element is a string in the format: </a:t>
+            </a:r>
+            <a:r>
+              <a:rPr lang="en-US" sz="1200" dirty="0"/>
+              <a:t>“/ &lt;direction&gt; &lt;speed&gt;”</a:t>
+            </a:r>
+            <a:endParaRPr lang="en-AU" sz="1200" dirty="0"/>
+          </a:p>
+        </p:txBody>
+      </p:sp>
+      <p:pic>
+        <p:nvPicPr>
+          <p:cNvPr id="1028" name="Picture 4" descr="Zenith angle (Θ) and the corresponding factor cos(Θ). n = surface... |  Download Scientific Diagram">
+            <a:extLst>
+              <a:ext uri="{FF2B5EF4-FFF2-40B4-BE49-F238E27FC236}">
+                <a16:creationId xmlns:a16="http://schemas.microsoft.com/office/drawing/2014/main" id="{E0BC0EDD-8E82-D0E4-102D-117F26E33F93}"/>
+              </a:ext>
+            </a:extLst>
+          </p:cNvPr>
+          <p:cNvPicPr>
+            <a:picLocks noChangeAspect="1" noChangeArrowheads="1"/>
+          </p:cNvPicPr>
+          <p:nvPr/>
+        </p:nvPicPr>
+        <p:blipFill rotWithShape="1">
+          <a:blip r:embed="rId2">
+            <a:extLst>
+              <a:ext uri="{28A0092B-C50C-407E-A947-70E740481C1C}">
+                <a14:useLocalDpi xmlns:a14="http://schemas.microsoft.com/office/drawing/2010/main" val="0"/>
+              </a:ext>
+            </a:extLst>
+          </a:blip>
+          <a:srcRect l="36258" r="36798" b="41237"/>
+          <a:stretch/>
+        </p:blipFill>
+        <p:spPr bwMode="auto">
+          <a:xfrm flipH="1">
+            <a:off x="7327649" y="4949324"/>
+            <a:ext cx="2253049" cy="1514273"/>
+          </a:xfrm>
+          <a:prstGeom prst="rect">
+            <a:avLst/>
+          </a:prstGeom>
+          <a:noFill/>
+          <a:extLst>
+            <a:ext uri="{909E8E84-426E-40DD-AFC4-6F175D3DCCD1}">
+              <a14:hiddenFill xmlns:a14="http://schemas.microsoft.com/office/drawing/2010/main">
+                <a:solidFill>
+                  <a:srgbClr val="FFFFFF"/>
+                </a:solidFill>
+              </a14:hiddenFill>
+            </a:ext>
+          </a:extLst>
+        </p:spPr>
+      </p:pic>
+      <p:sp>
+        <p:nvSpPr>
           <p:cNvPr id="19" name="Right Arrow 18">
             <a:extLst>
               <a:ext uri="{FF2B5EF4-FFF2-40B4-BE49-F238E27FC236}">
@@ -4128,7 +4973,7 @@
 </p:sld>
 </file>
 
-<file path=ppt/slides/slide2.xml><?xml version="1.0" encoding="utf-8"?>
+<file path=ppt/slides/slide3.xml><?xml version="1.0" encoding="utf-8"?>
 <p:sld xmlns:a="http://schemas.openxmlformats.org/drawingml/2006/main" xmlns:r="http://schemas.openxmlformats.org/officeDocument/2006/relationships" xmlns:p="http://schemas.openxmlformats.org/presentationml/2006/main">
   <p:cSld>
     <p:spTree>

</xml_diff>